<commit_message>
Update DTN_SBC-USRT-속도 변경의 건.pptx
200902
</commit_message>
<xml_diff>
--- a/1. Project/DTNPL/Weekly Report/DTN_SBC-USRT-속도 변경의 건.pptx
+++ b/1. Project/DTNPL/Weekly Report/DTN_SBC-USRT-속도 변경의 건.pptx
@@ -5190,15 +5190,7 @@
           <a:p>
             <a:r>
               <a:rPr lang="en-US" altLang="ko-KR" dirty="0" smtClean="0"/>
-              <a:t>USRT</a:t>
-            </a:r>
-            <a:r>
-              <a:rPr lang="en-US" altLang="ko-KR" dirty="0" smtClean="0"/>
-              <a:t> </a:t>
-            </a:r>
-            <a:r>
-              <a:rPr lang="en-US" altLang="ko-KR" dirty="0" smtClean="0"/>
-              <a:t>Speed </a:t>
+              <a:t>USRT Speed </a:t>
             </a:r>
             <a:r>
               <a:rPr lang="ko-KR" altLang="en-US" dirty="0"/>
@@ -5645,13 +5637,7 @@
               <a:rPr lang="en-US" altLang="ko-KR" dirty="0" smtClean="0">
                 <a:latin typeface="맑은 고딕" panose="020B0503020000020004" pitchFamily="50" charset="-127"/>
               </a:rPr>
-              <a:t>ION </a:t>
-            </a:r>
-            <a:r>
-              <a:rPr lang="en-US" altLang="ko-KR" dirty="0" smtClean="0">
-                <a:latin typeface="맑은 고딕" panose="020B0503020000020004" pitchFamily="50" charset="-127"/>
-              </a:rPr>
-              <a:t>S/W</a:t>
+              <a:t>ION S/W</a:t>
             </a:r>
             <a:r>
               <a:rPr lang="ko-KR" altLang="en-US" dirty="0" smtClean="0">
@@ -8770,47 +8756,41 @@
               <a:t>목표  </a:t>
             </a:r>
             <a:r>
-              <a:rPr lang="en-US" altLang="ko-KR" dirty="0"/>
-              <a:t>ION S/W UDP  </a:t>
-            </a:r>
-            <a:r>
-              <a:rPr lang="en-US" altLang="ko-KR" dirty="0" err="1"/>
-              <a:t>transmitte</a:t>
-            </a:r>
-            <a:r>
-              <a:rPr lang="en-US" altLang="ko-KR" dirty="0"/>
-              <a:t> speed is up to </a:t>
-            </a:r>
-            <a:r>
               <a:rPr lang="en-US" altLang="ko-KR" dirty="0" smtClean="0"/>
-              <a:t>1.5MBps</a:t>
+              <a:t/>
             </a:r>
             <a:br>
               <a:rPr lang="en-US" altLang="ko-KR" dirty="0" smtClean="0"/>
             </a:br>
             <a:r>
               <a:rPr lang="en-US" altLang="ko-KR" dirty="0" smtClean="0"/>
-              <a:t>                       </a:t>
+              <a:t>ION S/W  : The MAX transmission speed via UDP </a:t>
             </a:r>
             <a:r>
               <a:rPr lang="en-US" altLang="ko-KR" dirty="0"/>
-              <a:t>SBC F/W USRT </a:t>
-            </a:r>
-            <a:r>
-              <a:rPr lang="en-US" altLang="ko-KR" dirty="0" err="1"/>
-              <a:t>transmitte</a:t>
-            </a:r>
-            <a:r>
-              <a:rPr lang="en-US" altLang="ko-KR" dirty="0"/>
-              <a:t> speed is up to </a:t>
+              <a:t>is up to </a:t>
             </a:r>
             <a:r>
               <a:rPr lang="en-US" altLang="ko-KR" dirty="0" smtClean="0"/>
-              <a:t>1.6Mbps</a:t>
+              <a:t>1.5MBps</a:t>
             </a:r>
             <a:br>
               <a:rPr lang="en-US" altLang="ko-KR" dirty="0" smtClean="0"/>
             </a:br>
+            <a:r>
+              <a:rPr lang="en-US" altLang="ko-KR" dirty="0" smtClean="0"/>
+              <a:t>SBC F/W : The MAX. USRT transmission </a:t>
+            </a:r>
+            <a:r>
+              <a:rPr lang="en-US" altLang="ko-KR" dirty="0"/>
+              <a:t>speed is up to </a:t>
+            </a:r>
+            <a:r>
+              <a:rPr lang="en-US" altLang="ko-KR" dirty="0" smtClean="0"/>
+              <a:t>1.6Mbps</a:t>
+            </a:r>
+          </a:p>
+          <a:p>
             <a:endParaRPr lang="en-US" altLang="ko-KR" dirty="0" smtClean="0"/>
           </a:p>
           <a:p>
@@ -8819,15 +8799,15 @@
               <a:t>   </a:t>
             </a:r>
             <a:r>
-              <a:rPr lang="ko-KR" altLang="en-US" dirty="0"/>
+              <a:rPr lang="ko-KR" altLang="en-US" dirty="0" smtClean="0"/>
               <a:t>현재까지의 시험 결과는 </a:t>
             </a:r>
             <a:r>
-              <a:rPr lang="en-US" altLang="ko-KR" dirty="0"/>
+              <a:rPr lang="en-US" altLang="ko-KR" dirty="0" smtClean="0"/>
               <a:t>USRT </a:t>
             </a:r>
             <a:r>
-              <a:rPr lang="ko-KR" altLang="en-US" dirty="0"/>
+              <a:rPr lang="ko-KR" altLang="en-US" dirty="0" smtClean="0"/>
               <a:t>최대 전송 속도는 </a:t>
             </a:r>
             <a:r>
@@ -8836,11 +8816,8 @@
             </a:r>
           </a:p>
           <a:p>
-            <a:endParaRPr lang="en-US" altLang="ko-KR" dirty="0"/>
-          </a:p>
-          <a:p>
-            <a:r>
-              <a:rPr lang="en-US" altLang="ko-KR" dirty="0"/>
+            <a:r>
+              <a:rPr lang="en-US" altLang="ko-KR" dirty="0" smtClean="0"/>
               <a:t>  </a:t>
             </a:r>
             <a:r>
@@ -8902,6 +8879,22 @@
             <a:r>
               <a:rPr lang="ko-KR" altLang="en-US" dirty="0"/>
               <a:t>값 </a:t>
+            </a:r>
+            <a:r>
+              <a:rPr lang="en-US" altLang="ko-KR" dirty="0" smtClean="0"/>
+              <a:t>(</a:t>
+            </a:r>
+            <a:r>
+              <a:rPr lang="en-US" altLang="ko-KR" dirty="0" smtClean="0"/>
+              <a:t>USRT 2MHz Clock </a:t>
+            </a:r>
+            <a:r>
+              <a:rPr lang="ko-KR" altLang="en-US" dirty="0" smtClean="0"/>
+              <a:t>기준 산정</a:t>
+            </a:r>
+            <a:r>
+              <a:rPr lang="en-US" altLang="ko-KR" dirty="0" smtClean="0"/>
+              <a:t>)</a:t>
             </a:r>
             <a:r>
               <a:rPr lang="en-US" altLang="ko-KR" dirty="0" smtClean="0"/>

</xml_diff>